<commit_message>
Final version for Hilbert spaces
</commit_message>
<xml_diff>
--- a/2025/20250301-UnphysicalHilbert.pptx
+++ b/2025/20250301-UnphysicalHilbert.pptx
@@ -221,7 +221,7 @@
           <a:p>
             <a:fld id="{E119C704-B8F9-449B-B828-36D786A1FE73}" type="datetimeFigureOut">
               <a:rPr lang="en-US" smtClean="0"/>
-              <a:t>2/22/2025</a:t>
+              <a:t>2/27/2025</a:t>
             </a:fld>
             <a:endParaRPr lang="en-US"/>
           </a:p>
@@ -534,7 +534,7 @@
           <a:p>
             <a:r>
               <a:rPr lang="en-US" dirty="0"/>
-              <a:t>This video is based on our recent paper that shows how Hilbert spaces do not handle infinity in a way that is physically meaningful. While infinity in physics is potential, we can imagine to measure higher and higher values, Hilbert spaces treat it as actual. It gives us states, pure state not statistical mixture, that have say, infinite average energy… or infinite average position. Which is kind of a problem: where am I supposed to put my detector? Worst of all, the same state can have finite average position for me and infinite for you. The principle of relativity may have a tiny problem with that… But wait! There is more! You can evolve finite expectation to infinite expectation… in finite time! And then evolve it back to finite expectation… in finite time! So you oscillate from finite to infinite to finite to infinite on and on… If you are like me, and want to make sure that physical theories are really about things we can produce and measure in a lab… It’s a problem. Also, you may know that quantum field theory have problems with infinities… maybe, just maybe, these are related? And if we understand how to fix the first, maybe, just maybe, we fix at least some of the others?</a:t>
+              <a:t>This video is based on our recent paper that shows how Hilbert spaces do not handle infinity in a way that is physically meaningful. Infinity in physics is potential, we can imagine to measure higher and higher values. We do not measure an actual infinity. Hilbert spaces treat infinity as actual: they include states, pure state not statistical mixtures, that have say, infinite average energy… or infinite average position. Which is kind of a problem: where am I supposed to put my detector? Worst of all, the same state can have finite average position for me and infinite for you. I think the principle of relativity may have a tiny problem with that… But wait! There is more! You can evolve finite expectation to infinite expectation… in finite time! And then evolve it back to finite expectation… in finite time! So you oscillate from finite to infinite to finite to infinite on and on… If you are like me, and want to make sure that our physical theories are really about things we can produce and measure in a lab… It’s a problem. Also, you may know that quantum field theory have problems with infinities… maybe, just maybe, these are related? And if we understand how to fix the first, maybe, just maybe, we fix at least some of the others?</a:t>
             </a:r>
           </a:p>
           <a:p>
@@ -543,7 +543,7 @@
           <a:p>
             <a:r>
               <a:rPr lang="en-US" dirty="0"/>
-              <a:t>To me this seems like an obvious problem that needs to be highlighted and addressed. Apparently, given the number of rejections, many people disagree. In the words of one reviewer: “</a:t>
+              <a:t>To me this seemed like an obvious problem, so I didn’t quite understand why this hadn’t been already highlighted and addressed. Then we went through peer review… “</a:t>
             </a:r>
             <a:r>
               <a:rPr lang="en-US" sz="1800" dirty="0">
@@ -570,7 +570,7 @@
                 <a:ea typeface="Calibri" panose="020F0502020204030204" pitchFamily="34" charset="0"/>
                 <a:cs typeface="Times New Roman" panose="02020603050405020304" pitchFamily="18" charset="0"/>
               </a:rPr>
-              <a:t> is rather pointless.” And then, they go on and talk about their interpretation fixes everything. So, yeah… talking about hidden variables, parallel worlds… things that are, by definition, not experimentally testable, is ok. But trying to understand what parts of the math actually map to physically realizable objects? Oh, that’s pointless. At least it’s clear to me why the foundations of physics are still a mess… but I digress. Oh, if you want me to make a video where I digress on all this nonsense… Let me know in the comments.</a:t>
+              <a:t> is rather pointless.” Is it really such an outrageous proposition that the math should represent physical things… in a physical theory? If you want, I’ll make a separate video to go through that, and how I am now very skeptical that we’ll ever converge to a solid foundations of quantum mechanics. But while ranting is fun, it doesn’t solve the problem.</a:t>
             </a:r>
           </a:p>
           <a:p>
@@ -589,7 +589,44 @@
                 <a:ea typeface="Calibri" panose="020F0502020204030204" pitchFamily="34" charset="0"/>
                 <a:cs typeface="Times New Roman" panose="02020603050405020304" pitchFamily="18" charset="0"/>
               </a:rPr>
-              <a:t>As usual on this channel, we will go through the details, so that you can double check what I say. Never take my word for it. Essentially, we break down the mathematical definition of a Hilbert space, and see what properties correspond to physical requirements and which do not. A Hilbert space is a vector space with an inner product. This part we need. It is physical because without it, we do not have the physics. A Hilbert space is also closed under Cauchy sequences. This is what brings in the bad infinity. That part is what should be stripped out. We need another way to characterize the closure under infinite linear combinations. That’s essentially the problem. So let’s get started!</a:t>
+              <a:t>What does solve the problem? What we always do here: go through the details. This is what we are going to do.</a:t>
+            </a:r>
+          </a:p>
+          <a:p>
+            <a:endParaRPr lang="en-US" sz="1800" dirty="0">
+              <a:effectLst/>
+              <a:latin typeface="Calibri" panose="020F0502020204030204" pitchFamily="34" charset="0"/>
+              <a:ea typeface="Calibri" panose="020F0502020204030204" pitchFamily="34" charset="0"/>
+              <a:cs typeface="Times New Roman" panose="02020603050405020304" pitchFamily="18" charset="0"/>
+            </a:endParaRPr>
+          </a:p>
+          <a:p>
+            <a:r>
+              <a:rPr lang="en-US" sz="1800" dirty="0">
+                <a:effectLst/>
+                <a:latin typeface="Calibri" panose="020F0502020204030204" pitchFamily="34" charset="0"/>
+                <a:ea typeface="Calibri" panose="020F0502020204030204" pitchFamily="34" charset="0"/>
+                <a:cs typeface="Times New Roman" panose="02020603050405020304" pitchFamily="18" charset="0"/>
+              </a:rPr>
+              <a:t>First, we are going to see what it means to have physical mathematical definition, how ideally the mapping between math and physics should work. Then, we break down the mathematical definition of a Hilbert space, and see what properties correspond to physical requirements and which do not. A Hilbert space is a vector space with an inner product. This part we need. It is physical because without it, we cannot talk about entropy, statistical mixtures, probability and so on… we would not have the physics. A Hilbert space is also closed under Cauchy sequences. This is what brings in the bad infinity, and we’ll see how. That part is what should be stripped out. That’s the problem. We’ll see how Schwartz spaces, in some cases, are much better… but they are not a general solution. The point of this video: let’s at least realize we have a </a:t>
+            </a:r>
+            <a:r>
+              <a:rPr lang="en-US" sz="1800">
+                <a:effectLst/>
+                <a:latin typeface="Calibri" panose="020F0502020204030204" pitchFamily="34" charset="0"/>
+                <a:ea typeface="Calibri" panose="020F0502020204030204" pitchFamily="34" charset="0"/>
+                <a:cs typeface="Times New Roman" panose="02020603050405020304" pitchFamily="18" charset="0"/>
+              </a:rPr>
+              <a:t>problem. </a:t>
+            </a:r>
+            <a:r>
+              <a:rPr lang="en-US" sz="1800" dirty="0">
+                <a:effectLst/>
+                <a:latin typeface="Calibri" panose="020F0502020204030204" pitchFamily="34" charset="0"/>
+                <a:ea typeface="Calibri" panose="020F0502020204030204" pitchFamily="34" charset="0"/>
+                <a:cs typeface="Times New Roman" panose="02020603050405020304" pitchFamily="18" charset="0"/>
+              </a:rPr>
+              <a:t>So let’s get started!</a:t>
             </a:r>
           </a:p>
         </p:txBody>
@@ -777,7 +814,7 @@
           <a:p>
             <a:fld id="{DBFECF9E-8B09-4099-B1BA-6ADDA94A0342}" type="datetime1">
               <a:rPr lang="en-US" smtClean="0"/>
-              <a:t>2/22/2025</a:t>
+              <a:t>2/27/2025</a:t>
             </a:fld>
             <a:endParaRPr lang="en-US"/>
           </a:p>
@@ -1281,7 +1318,7 @@
           <a:p>
             <a:fld id="{C2E4689B-730B-4AF6-A7AC-5BF745BF6CF6}" type="datetime1">
               <a:rPr lang="en-US" smtClean="0"/>
-              <a:t>2/22/2025</a:t>
+              <a:t>2/27/2025</a:t>
             </a:fld>
             <a:endParaRPr lang="en-US"/>
           </a:p>
@@ -1492,7 +1529,7 @@
           <a:p>
             <a:fld id="{849CD730-13C7-4BA8-9C49-4344F22DB36C}" type="datetime1">
               <a:rPr lang="en-US" smtClean="0"/>
-              <a:t>2/22/2025</a:t>
+              <a:t>2/27/2025</a:t>
             </a:fld>
             <a:endParaRPr lang="en-US"/>
           </a:p>
@@ -1721,7 +1758,7 @@
           <a:p>
             <a:fld id="{14040F82-CAAF-492E-A3B6-9D23E7AB0A58}" type="datetime1">
               <a:rPr lang="en-US" smtClean="0"/>
-              <a:t>2/22/2025</a:t>
+              <a:t>2/27/2025</a:t>
             </a:fld>
             <a:endParaRPr lang="en-US" dirty="0"/>
           </a:p>
@@ -1971,7 +2008,7 @@
           <a:p>
             <a:fld id="{5E94585C-5462-4635-A827-CBBCD3A2E6B8}" type="datetime1">
               <a:rPr lang="en-US" smtClean="0"/>
-              <a:t>2/22/2025</a:t>
+              <a:t>2/27/2025</a:t>
             </a:fld>
             <a:endParaRPr lang="en-US"/>
           </a:p>
@@ -2239,7 +2276,7 @@
           <a:p>
             <a:fld id="{B09B1218-991B-4184-B0F8-198D0FAC17F9}" type="datetime1">
               <a:rPr lang="en-US" smtClean="0"/>
-              <a:t>2/22/2025</a:t>
+              <a:t>2/27/2025</a:t>
             </a:fld>
             <a:endParaRPr lang="en-US"/>
           </a:p>
@@ -2654,7 +2691,7 @@
           <a:p>
             <a:fld id="{9555B3F8-63BD-45A8-8D64-7C6391B4DEC4}" type="datetime1">
               <a:rPr lang="en-US" smtClean="0"/>
-              <a:t>2/22/2025</a:t>
+              <a:t>2/27/2025</a:t>
             </a:fld>
             <a:endParaRPr lang="en-US"/>
           </a:p>
@@ -2798,7 +2835,7 @@
           <a:p>
             <a:fld id="{B6287A86-4DED-4531-AD0C-FE6F48B43375}" type="datetime1">
               <a:rPr lang="en-US" smtClean="0"/>
-              <a:t>2/22/2025</a:t>
+              <a:t>2/27/2025</a:t>
             </a:fld>
             <a:endParaRPr lang="en-US"/>
           </a:p>
@@ -2914,7 +2951,7 @@
           <a:p>
             <a:fld id="{2BB7EE58-DC87-4D11-AA22-E3A6718A2E80}" type="datetime1">
               <a:rPr lang="en-US" smtClean="0"/>
-              <a:t>2/22/2025</a:t>
+              <a:t>2/27/2025</a:t>
             </a:fld>
             <a:endParaRPr lang="en-US" dirty="0"/>
           </a:p>
@@ -3229,7 +3266,7 @@
           <a:p>
             <a:fld id="{F681BEE4-EED9-4644-8E5D-BAF3D04BB52D}" type="datetime1">
               <a:rPr lang="en-US" smtClean="0"/>
-              <a:t>2/22/2025</a:t>
+              <a:t>2/27/2025</a:t>
             </a:fld>
             <a:endParaRPr lang="en-US"/>
           </a:p>
@@ -3520,7 +3557,7 @@
           <a:p>
             <a:fld id="{6E9AAFE7-E238-4DAA-A26B-A60C405FBFD6}" type="datetime1">
               <a:rPr lang="en-US" smtClean="0"/>
-              <a:t>2/22/2025</a:t>
+              <a:t>2/27/2025</a:t>
             </a:fld>
             <a:endParaRPr lang="en-US"/>
           </a:p>
@@ -3764,7 +3801,7 @@
           <a:p>
             <a:fld id="{F865660A-2FFB-4EA8-A917-E41016B95ABA}" type="datetime1">
               <a:rPr lang="en-US" smtClean="0"/>
-              <a:t>2/22/2025</a:t>
+              <a:t>2/27/2025</a:t>
             </a:fld>
             <a:endParaRPr lang="en-US" dirty="0"/>
           </a:p>
@@ -4808,8 +4845,8 @@
           </p:sp>
         </mc:Fallback>
       </mc:AlternateContent>
-      <mc:AlternateContent xmlns:mc="http://schemas.openxmlformats.org/markup-compatibility/2006">
-        <mc:Choice xmlns:a14="http://schemas.microsoft.com/office/drawing/2010/main" Requires="a14">
+      <mc:AlternateContent xmlns:mc="http://schemas.openxmlformats.org/markup-compatibility/2006" xmlns:a14="http://schemas.microsoft.com/office/drawing/2010/main">
+        <mc:Choice Requires="a14">
           <p:sp>
             <p:nvSpPr>
               <p:cNvPr id="4" name="TextBox 3">
@@ -4962,7 +4999,7 @@
             </p:txBody>
           </p:sp>
         </mc:Choice>
-        <mc:Fallback>
+        <mc:Fallback xmlns="">
           <p:sp>
             <p:nvSpPr>
               <p:cNvPr id="4" name="TextBox 3">
@@ -9092,8 +9129,8 @@
           </a:p>
         </p:txBody>
       </p:sp>
-      <mc:AlternateContent xmlns:mc="http://schemas.openxmlformats.org/markup-compatibility/2006">
-        <mc:Choice xmlns:a14="http://schemas.microsoft.com/office/drawing/2010/main" Requires="a14">
+      <mc:AlternateContent xmlns:mc="http://schemas.openxmlformats.org/markup-compatibility/2006" xmlns:a14="http://schemas.microsoft.com/office/drawing/2010/main">
+        <mc:Choice Requires="a14">
           <p:sp>
             <p:nvSpPr>
               <p:cNvPr id="6" name="TextBox 5">
@@ -9396,7 +9433,7 @@
             </p:txBody>
           </p:sp>
         </mc:Choice>
-        <mc:Fallback>
+        <mc:Fallback xmlns="">
           <p:sp>
             <p:nvSpPr>
               <p:cNvPr id="6" name="TextBox 5">
@@ -9892,8 +9929,8 @@
           </p:sp>
         </mc:Fallback>
       </mc:AlternateContent>
-      <mc:AlternateContent xmlns:mc="http://schemas.openxmlformats.org/markup-compatibility/2006">
-        <mc:Choice xmlns:a14="http://schemas.microsoft.com/office/drawing/2010/main" Requires="a14">
+      <mc:AlternateContent xmlns:mc="http://schemas.openxmlformats.org/markup-compatibility/2006" xmlns:a14="http://schemas.microsoft.com/office/drawing/2010/main">
+        <mc:Choice Requires="a14">
           <p:sp>
             <p:nvSpPr>
               <p:cNvPr id="4" name="TextBox 3">
@@ -10237,7 +10274,7 @@
             </p:txBody>
           </p:sp>
         </mc:Choice>
-        <mc:Fallback>
+        <mc:Fallback xmlns="">
           <p:sp>
             <p:nvSpPr>
               <p:cNvPr id="4" name="TextBox 3">
@@ -10358,8 +10395,8 @@
           </a:fontRef>
         </p:style>
       </p:cxnSp>
-      <mc:AlternateContent xmlns:mc="http://schemas.openxmlformats.org/markup-compatibility/2006">
-        <mc:Choice xmlns:a14="http://schemas.microsoft.com/office/drawing/2010/main" Requires="a14">
+      <mc:AlternateContent xmlns:mc="http://schemas.openxmlformats.org/markup-compatibility/2006" xmlns:a14="http://schemas.microsoft.com/office/drawing/2010/main">
+        <mc:Choice Requires="a14">
           <p:sp>
             <p:nvSpPr>
               <p:cNvPr id="10" name="TextBox 9">
@@ -10475,7 +10512,7 @@
             </p:txBody>
           </p:sp>
         </mc:Choice>
-        <mc:Fallback>
+        <mc:Fallback xmlns="">
           <p:sp>
             <p:nvSpPr>
               <p:cNvPr id="10" name="TextBox 9">
@@ -11192,8 +11229,8 @@
           </a:p>
         </p:txBody>
       </p:sp>
-      <mc:AlternateContent xmlns:mc="http://schemas.openxmlformats.org/markup-compatibility/2006">
-        <mc:Choice xmlns:a14="http://schemas.microsoft.com/office/drawing/2010/main" Requires="a14">
+      <mc:AlternateContent xmlns:mc="http://schemas.openxmlformats.org/markup-compatibility/2006" xmlns:a14="http://schemas.microsoft.com/office/drawing/2010/main">
+        <mc:Choice Requires="a14">
           <p:sp>
             <p:nvSpPr>
               <p:cNvPr id="2" name="TextBox 1">
@@ -11222,6 +11259,7 @@
               </a:bodyPr>
               <a:lstStyle/>
               <a:p>
+                <a:pPr/>
                 <a14:m>
                   <m:oMathPara xmlns:m="http://schemas.openxmlformats.org/officeDocument/2006/math">
                     <m:oMathParaPr>
@@ -11305,7 +11343,7 @@
             </p:txBody>
           </p:sp>
         </mc:Choice>
-        <mc:Fallback>
+        <mc:Fallback xmlns="">
           <p:sp>
             <p:nvSpPr>
               <p:cNvPr id="2" name="TextBox 1">
@@ -11802,8 +11840,8 @@
           </a:fontRef>
         </p:style>
       </p:cxnSp>
-      <mc:AlternateContent xmlns:mc="http://schemas.openxmlformats.org/markup-compatibility/2006">
-        <mc:Choice xmlns:a14="http://schemas.microsoft.com/office/drawing/2010/main" Requires="a14">
+      <mc:AlternateContent xmlns:mc="http://schemas.openxmlformats.org/markup-compatibility/2006" xmlns:a14="http://schemas.microsoft.com/office/drawing/2010/main">
+        <mc:Choice Requires="a14">
           <p:sp>
             <p:nvSpPr>
               <p:cNvPr id="7" name="TextBox 6">
@@ -11939,7 +11977,7 @@
             </p:txBody>
           </p:sp>
         </mc:Choice>
-        <mc:Fallback>
+        <mc:Fallback xmlns="">
           <p:sp>
             <p:nvSpPr>
               <p:cNvPr id="7" name="TextBox 6">
@@ -11984,8 +12022,8 @@
           </p:sp>
         </mc:Fallback>
       </mc:AlternateContent>
-      <mc:AlternateContent xmlns:mc="http://schemas.openxmlformats.org/markup-compatibility/2006">
-        <mc:Choice xmlns:a14="http://schemas.microsoft.com/office/drawing/2010/main" Requires="a14">
+      <mc:AlternateContent xmlns:mc="http://schemas.openxmlformats.org/markup-compatibility/2006" xmlns:a14="http://schemas.microsoft.com/office/drawing/2010/main">
+        <mc:Choice Requires="a14">
           <p:sp>
             <p:nvSpPr>
               <p:cNvPr id="8" name="TextBox 7">
@@ -12054,7 +12092,7 @@
             </p:txBody>
           </p:sp>
         </mc:Choice>
-        <mc:Fallback>
+        <mc:Fallback xmlns="">
           <p:sp>
             <p:nvSpPr>
               <p:cNvPr id="8" name="TextBox 7">
@@ -12099,8 +12137,8 @@
           </p:sp>
         </mc:Fallback>
       </mc:AlternateContent>
-      <mc:AlternateContent xmlns:mc="http://schemas.openxmlformats.org/markup-compatibility/2006">
-        <mc:Choice xmlns:a14="http://schemas.microsoft.com/office/drawing/2010/main" Requires="a14">
+      <mc:AlternateContent xmlns:mc="http://schemas.openxmlformats.org/markup-compatibility/2006" xmlns:a14="http://schemas.microsoft.com/office/drawing/2010/main">
+        <mc:Choice Requires="a14">
           <p:sp>
             <p:nvSpPr>
               <p:cNvPr id="10" name="TextBox 9">
@@ -12341,7 +12379,7 @@
             </p:txBody>
           </p:sp>
         </mc:Choice>
-        <mc:Fallback>
+        <mc:Fallback xmlns="">
           <p:sp>
             <p:nvSpPr>
               <p:cNvPr id="10" name="TextBox 9">
@@ -12736,8 +12774,8 @@
           </p:sp>
         </mc:Fallback>
       </mc:AlternateContent>
-      <mc:AlternateContent xmlns:mc="http://schemas.openxmlformats.org/markup-compatibility/2006">
-        <mc:Choice xmlns:a14="http://schemas.microsoft.com/office/drawing/2010/main" Requires="a14">
+      <mc:AlternateContent xmlns:mc="http://schemas.openxmlformats.org/markup-compatibility/2006" xmlns:a14="http://schemas.microsoft.com/office/drawing/2010/main">
+        <mc:Choice Requires="a14">
           <p:sp>
             <p:nvSpPr>
               <p:cNvPr id="3" name="TextBox 2">
@@ -12805,7 +12843,7 @@
             </p:txBody>
           </p:sp>
         </mc:Choice>
-        <mc:Fallback>
+        <mc:Fallback xmlns="">
           <p:sp>
             <p:nvSpPr>
               <p:cNvPr id="3" name="TextBox 2">
@@ -12850,8 +12888,8 @@
           </p:sp>
         </mc:Fallback>
       </mc:AlternateContent>
-      <mc:AlternateContent xmlns:mc="http://schemas.openxmlformats.org/markup-compatibility/2006">
-        <mc:Choice xmlns:a14="http://schemas.microsoft.com/office/drawing/2010/main" Requires="a14">
+      <mc:AlternateContent xmlns:mc="http://schemas.openxmlformats.org/markup-compatibility/2006" xmlns:a14="http://schemas.microsoft.com/office/drawing/2010/main">
+        <mc:Choice Requires="a14">
           <p:sp>
             <p:nvSpPr>
               <p:cNvPr id="4" name="TextBox 3">
@@ -12898,7 +12936,7 @@
             </p:txBody>
           </p:sp>
         </mc:Choice>
-        <mc:Fallback>
+        <mc:Fallback xmlns="">
           <p:sp>
             <p:nvSpPr>
               <p:cNvPr id="4" name="TextBox 3">
@@ -14229,8 +14267,8 @@
           </p:sp>
         </mc:Fallback>
       </mc:AlternateContent>
-      <mc:AlternateContent xmlns:mc="http://schemas.openxmlformats.org/markup-compatibility/2006">
-        <mc:Choice xmlns:a14="http://schemas.microsoft.com/office/drawing/2010/main" Requires="a14">
+      <mc:AlternateContent xmlns:mc="http://schemas.openxmlformats.org/markup-compatibility/2006" xmlns:a14="http://schemas.microsoft.com/office/drawing/2010/main">
+        <mc:Choice Requires="a14">
           <p:sp>
             <p:nvSpPr>
               <p:cNvPr id="12" name="TextBox 11">
@@ -14435,7 +14473,7 @@
             </p:txBody>
           </p:sp>
         </mc:Choice>
-        <mc:Fallback>
+        <mc:Fallback xmlns="">
           <p:sp>
             <p:nvSpPr>
               <p:cNvPr id="12" name="TextBox 11">
@@ -21224,8 +21262,8 @@
           </a:p>
         </p:txBody>
       </p:sp>
-      <mc:AlternateContent xmlns:mc="http://schemas.openxmlformats.org/markup-compatibility/2006">
-        <mc:Choice xmlns:a14="http://schemas.microsoft.com/office/drawing/2010/main" Requires="a14">
+      <mc:AlternateContent xmlns:mc="http://schemas.openxmlformats.org/markup-compatibility/2006" xmlns:a14="http://schemas.microsoft.com/office/drawing/2010/main">
+        <mc:Choice Requires="a14">
           <p:sp>
             <p:nvSpPr>
               <p:cNvPr id="3" name="TextBox 2">
@@ -21565,7 +21603,7 @@
             </p:txBody>
           </p:sp>
         </mc:Choice>
-        <mc:Fallback>
+        <mc:Fallback xmlns="">
           <p:sp>
             <p:nvSpPr>
               <p:cNvPr id="3" name="TextBox 2">
@@ -22972,8 +23010,8 @@
           </p:sp>
         </mc:Fallback>
       </mc:AlternateContent>
-      <mc:AlternateContent xmlns:mc="http://schemas.openxmlformats.org/markup-compatibility/2006">
-        <mc:Choice xmlns:a14="http://schemas.microsoft.com/office/drawing/2010/main" Requires="a14">
+      <mc:AlternateContent xmlns:mc="http://schemas.openxmlformats.org/markup-compatibility/2006" xmlns:a14="http://schemas.microsoft.com/office/drawing/2010/main">
+        <mc:Choice Requires="a14">
           <p:sp>
             <p:nvSpPr>
               <p:cNvPr id="20" name="TextBox 19">
@@ -23185,7 +23223,7 @@
             </p:txBody>
           </p:sp>
         </mc:Choice>
-        <mc:Fallback>
+        <mc:Fallback xmlns="">
           <p:sp>
             <p:nvSpPr>
               <p:cNvPr id="20" name="TextBox 19">
@@ -26359,8 +26397,8 @@
           </a:fontRef>
         </p:style>
       </p:cxnSp>
-      <mc:AlternateContent xmlns:mc="http://schemas.openxmlformats.org/markup-compatibility/2006">
-        <mc:Choice xmlns:a14="http://schemas.microsoft.com/office/drawing/2010/main" Requires="a14">
+      <mc:AlternateContent xmlns:mc="http://schemas.openxmlformats.org/markup-compatibility/2006" xmlns:a14="http://schemas.microsoft.com/office/drawing/2010/main">
+        <mc:Choice Requires="a14">
           <p:sp>
             <p:nvSpPr>
               <p:cNvPr id="7" name="TextBox 6">
@@ -26410,7 +26448,7 @@
             </p:txBody>
           </p:sp>
         </mc:Choice>
-        <mc:Fallback>
+        <mc:Fallback xmlns="">
           <p:sp>
             <p:nvSpPr>
               <p:cNvPr id="7" name="TextBox 6">
@@ -26455,8 +26493,8 @@
           </p:sp>
         </mc:Fallback>
       </mc:AlternateContent>
-      <mc:AlternateContent xmlns:mc="http://schemas.openxmlformats.org/markup-compatibility/2006">
-        <mc:Choice xmlns:a14="http://schemas.microsoft.com/office/drawing/2010/main" Requires="a14">
+      <mc:AlternateContent xmlns:mc="http://schemas.openxmlformats.org/markup-compatibility/2006" xmlns:a14="http://schemas.microsoft.com/office/drawing/2010/main">
+        <mc:Choice Requires="a14">
           <p:sp>
             <p:nvSpPr>
               <p:cNvPr id="8" name="TextBox 7">
@@ -26506,7 +26544,7 @@
             </p:txBody>
           </p:sp>
         </mc:Choice>
-        <mc:Fallback>
+        <mc:Fallback xmlns="">
           <p:sp>
             <p:nvSpPr>
               <p:cNvPr id="8" name="TextBox 7">
@@ -26938,8 +26976,8 @@
           </a:fontRef>
         </p:style>
       </p:cxnSp>
-      <mc:AlternateContent xmlns:mc="http://schemas.openxmlformats.org/markup-compatibility/2006">
-        <mc:Choice xmlns:a14="http://schemas.microsoft.com/office/drawing/2010/main" Requires="a14">
+      <mc:AlternateContent xmlns:mc="http://schemas.openxmlformats.org/markup-compatibility/2006" xmlns:a14="http://schemas.microsoft.com/office/drawing/2010/main">
+        <mc:Choice Requires="a14">
           <p:sp>
             <p:nvSpPr>
               <p:cNvPr id="25" name="TextBox 24">
@@ -27018,7 +27056,7 @@
             </p:txBody>
           </p:sp>
         </mc:Choice>
-        <mc:Fallback>
+        <mc:Fallback xmlns="">
           <p:sp>
             <p:nvSpPr>
               <p:cNvPr id="25" name="TextBox 24">
@@ -27553,8 +27591,8 @@
           </p:sp>
         </mc:Fallback>
       </mc:AlternateContent>
-      <mc:AlternateContent xmlns:mc="http://schemas.openxmlformats.org/markup-compatibility/2006">
-        <mc:Choice xmlns:a14="http://schemas.microsoft.com/office/drawing/2010/main" Requires="a14">
+      <mc:AlternateContent xmlns:mc="http://schemas.openxmlformats.org/markup-compatibility/2006" xmlns:a14="http://schemas.microsoft.com/office/drawing/2010/main">
+        <mc:Choice Requires="a14">
           <p:sp>
             <p:nvSpPr>
               <p:cNvPr id="6" name="TextBox 5">
@@ -27852,7 +27890,7 @@
             </p:txBody>
           </p:sp>
         </mc:Choice>
-        <mc:Fallback>
+        <mc:Fallback xmlns="">
           <p:sp>
             <p:nvSpPr>
               <p:cNvPr id="6" name="TextBox 5">
@@ -31418,8 +31456,8 @@
           </a:p>
         </p:txBody>
       </p:sp>
-      <mc:AlternateContent xmlns:mc="http://schemas.openxmlformats.org/markup-compatibility/2006">
-        <mc:Choice xmlns:a14="http://schemas.microsoft.com/office/drawing/2010/main" Requires="a14">
+      <mc:AlternateContent xmlns:mc="http://schemas.openxmlformats.org/markup-compatibility/2006" xmlns:a14="http://schemas.microsoft.com/office/drawing/2010/main">
+        <mc:Choice Requires="a14">
           <p:sp>
             <p:nvSpPr>
               <p:cNvPr id="3" name="TextBox 2">
@@ -31555,7 +31593,7 @@
             </p:txBody>
           </p:sp>
         </mc:Choice>
-        <mc:Fallback>
+        <mc:Fallback xmlns="">
           <p:sp>
             <p:nvSpPr>
               <p:cNvPr id="3" name="TextBox 2">
@@ -31600,8 +31638,8 @@
           </p:sp>
         </mc:Fallback>
       </mc:AlternateContent>
-      <mc:AlternateContent xmlns:mc="http://schemas.openxmlformats.org/markup-compatibility/2006">
-        <mc:Choice xmlns:a14="http://schemas.microsoft.com/office/drawing/2010/main" Requires="a14">
+      <mc:AlternateContent xmlns:mc="http://schemas.openxmlformats.org/markup-compatibility/2006" xmlns:a14="http://schemas.microsoft.com/office/drawing/2010/main">
+        <mc:Choice Requires="a14">
           <p:sp>
             <p:nvSpPr>
               <p:cNvPr id="4" name="TextBox 3">
@@ -31670,7 +31708,7 @@
             </p:txBody>
           </p:sp>
         </mc:Choice>
-        <mc:Fallback>
+        <mc:Fallback xmlns="">
           <p:sp>
             <p:nvSpPr>
               <p:cNvPr id="4" name="TextBox 3">
@@ -31715,8 +31753,8 @@
           </p:sp>
         </mc:Fallback>
       </mc:AlternateContent>
-      <mc:AlternateContent xmlns:mc="http://schemas.openxmlformats.org/markup-compatibility/2006">
-        <mc:Choice xmlns:a14="http://schemas.microsoft.com/office/drawing/2010/main" Requires="a14">
+      <mc:AlternateContent xmlns:mc="http://schemas.openxmlformats.org/markup-compatibility/2006" xmlns:a14="http://schemas.microsoft.com/office/drawing/2010/main">
+        <mc:Choice Requires="a14">
           <p:sp>
             <p:nvSpPr>
               <p:cNvPr id="5" name="TextBox 4">
@@ -31957,7 +31995,7 @@
             </p:txBody>
           </p:sp>
         </mc:Choice>
-        <mc:Fallback>
+        <mc:Fallback xmlns="">
           <p:sp>
             <p:nvSpPr>
               <p:cNvPr id="5" name="TextBox 4">
@@ -35636,8 +35674,8 @@
           </a:p>
         </p:txBody>
       </p:sp>
-      <mc:AlternateContent xmlns:mc="http://schemas.openxmlformats.org/markup-compatibility/2006">
-        <mc:Choice xmlns:a14="http://schemas.microsoft.com/office/drawing/2010/main" Requires="a14">
+      <mc:AlternateContent xmlns:mc="http://schemas.openxmlformats.org/markup-compatibility/2006" xmlns:a14="http://schemas.microsoft.com/office/drawing/2010/main">
+        <mc:Choice Requires="a14">
           <p:sp>
             <p:nvSpPr>
               <p:cNvPr id="17" name="TextBox 16">
@@ -35689,7 +35727,7 @@
             </p:txBody>
           </p:sp>
         </mc:Choice>
-        <mc:Fallback>
+        <mc:Fallback xmlns="">
           <p:sp>
             <p:nvSpPr>
               <p:cNvPr id="17" name="TextBox 16">
@@ -35734,8 +35772,8 @@
           </p:sp>
         </mc:Fallback>
       </mc:AlternateContent>
-      <mc:AlternateContent xmlns:mc="http://schemas.openxmlformats.org/markup-compatibility/2006">
-        <mc:Choice xmlns:a14="http://schemas.microsoft.com/office/drawing/2010/main" Requires="a14">
+      <mc:AlternateContent xmlns:mc="http://schemas.openxmlformats.org/markup-compatibility/2006" xmlns:a14="http://schemas.microsoft.com/office/drawing/2010/main">
+        <mc:Choice Requires="a14">
           <p:sp>
             <p:nvSpPr>
               <p:cNvPr id="22" name="TextBox 21">
@@ -35795,7 +35833,7 @@
             </p:txBody>
           </p:sp>
         </mc:Choice>
-        <mc:Fallback>
+        <mc:Fallback xmlns="">
           <p:sp>
             <p:nvSpPr>
               <p:cNvPr id="22" name="TextBox 21">

</xml_diff>